<commit_message>
Correcting my faults, changing presentation
</commit_message>
<xml_diff>
--- a/Застосування методів машинного навчання для прогнозування елементів конструкцій.pptx
+++ b/Застосування методів машинного навчання для прогнозування елементів конструкцій.pptx
@@ -3852,7 +3852,6 @@
           </a:bodyPr>
           <a:lstStyle/>
           <a:p>
-            <a:pPr algn="ctr"/>
             <a:r>
               <a:rPr lang="uk-UA" sz="4000" dirty="0"/>
               <a:t>ВИСНОВКИ</a:t>
@@ -3876,12 +3875,66 @@
             <p:ph idx="1"/>
           </p:nvPr>
         </p:nvSpPr>
-        <p:spPr/>
+        <p:spPr>
+          <a:xfrm>
+            <a:off x="1261871" y="1828800"/>
+            <a:ext cx="10031771" cy="5029200"/>
+          </a:xfrm>
+        </p:spPr>
         <p:txBody>
           <a:bodyPr/>
           <a:lstStyle/>
           <a:p>
-            <a:endParaRPr lang="uk-UA"/>
+            <a:r>
+              <a:rPr lang="uk-UA" dirty="0"/>
+              <a:t>Сформульовано математичну постановку задачі прогнозування руйнування елементів конструкцій через ріст втомних тріщин.</a:t>
+            </a:r>
+          </a:p>
+          <a:p>
+            <a:r>
+              <a:rPr lang="uk-UA" dirty="0"/>
+              <a:t>Розглянуто</a:t>
+            </a:r>
+            <a:r>
+              <a:rPr lang="ru-RU" dirty="0"/>
+              <a:t> </a:t>
+            </a:r>
+            <a:r>
+              <a:rPr lang="uk-UA" dirty="0"/>
+              <a:t>теоретичні принципи й методи</a:t>
+            </a:r>
+            <a:r>
+              <a:rPr lang="ru-RU" dirty="0"/>
+              <a:t> </a:t>
+            </a:r>
+            <a:r>
+              <a:rPr lang="uk-UA" dirty="0"/>
+              <a:t>машинного навчання, різні його види.</a:t>
+            </a:r>
+          </a:p>
+          <a:p>
+            <a:r>
+              <a:rPr lang="uk-UA" dirty="0"/>
+              <a:t>Розглянуто теоретичні принципи побудови та роботи нейронних мереж, описано алгоритми навчання: зворотного поширення помилки, генетичний.</a:t>
+            </a:r>
+          </a:p>
+          <a:p>
+            <a:r>
+              <a:rPr lang="uk-UA" dirty="0"/>
+              <a:t>Розглянуто принципи появи втомних тріщин, моделі задачі про швидкість росту втомних тріщин.</a:t>
+            </a:r>
+          </a:p>
+          <a:p>
+            <a:r>
+              <a:rPr lang="uk-UA" dirty="0"/>
+              <a:t>Створено та протестовано програмний код розв’язання задачі за допомогою нейронної мережі.</a:t>
+            </a:r>
+          </a:p>
+          <a:p>
+            <a:r>
+              <a:rPr lang="uk-UA" dirty="0"/>
+              <a:t>Порівняно алгоритми зворотного поширення помилки та генетичний, визначено перевагу першого у швидкості навчання та збіжності до оптимального результату.</a:t>
+            </a:r>
           </a:p>
         </p:txBody>
       </p:sp>
@@ -4004,7 +4057,6 @@
           </a:bodyPr>
           <a:lstStyle/>
           <a:p>
-            <a:pPr algn="ctr"/>
             <a:r>
               <a:rPr lang="uk-UA" sz="4000" dirty="0"/>
               <a:t>ВСТУП</a:t>
@@ -4028,12 +4080,128 @@
             <p:ph idx="1"/>
           </p:nvPr>
         </p:nvSpPr>
-        <p:spPr/>
-        <p:txBody>
-          <a:bodyPr/>
-          <a:lstStyle/>
-          <a:p>
-            <a:endParaRPr lang="uk-UA"/>
+        <p:spPr>
+          <a:xfrm>
+            <a:off x="1261871" y="1828800"/>
+            <a:ext cx="10074995" cy="5029200"/>
+          </a:xfrm>
+        </p:spPr>
+        <p:txBody>
+          <a:bodyPr>
+            <a:normAutofit lnSpcReduction="10000"/>
+          </a:bodyPr>
+          <a:lstStyle/>
+          <a:p>
+            <a:r>
+              <a:rPr lang="uk-UA" dirty="0"/>
+              <a:t>Об'єкт дослідження: методи машинного навчання як інструменти для прогнозування швидкості росту втомних тріщин.</a:t>
+            </a:r>
+          </a:p>
+          <a:p>
+            <a:r>
+              <a:rPr lang="uk-UA" dirty="0"/>
+              <a:t>Предметами</a:t>
+            </a:r>
+            <a:r>
+              <a:rPr lang="ru-RU" dirty="0"/>
+              <a:t> </a:t>
+            </a:r>
+            <a:r>
+              <a:rPr lang="uk-UA" dirty="0"/>
+              <a:t>дослідження є моделі опорних елементів конструкцій із втомними тріщинами. </a:t>
+            </a:r>
+          </a:p>
+          <a:p>
+            <a:r>
+              <a:rPr lang="uk-UA" dirty="0"/>
+              <a:t>Метою дослідження є оцінка міцності та залишкової довговічності елементів конструкцій методами машинного навчання. </a:t>
+            </a:r>
+          </a:p>
+          <a:p>
+            <a:r>
+              <a:rPr lang="uk-UA" dirty="0"/>
+              <a:t>Поставлені завдання:</a:t>
+            </a:r>
+          </a:p>
+          <a:p>
+            <a:r>
+              <a:rPr lang="uk-UA" dirty="0"/>
+              <a:t>Аналітичний огляд методів машинного навчання.</a:t>
+            </a:r>
+          </a:p>
+          <a:p>
+            <a:r>
+              <a:rPr lang="uk-UA" dirty="0"/>
+              <a:t>Створення програмного забезпечення для створення та навчання нейронної мережі, визначення її оптимальної архітектури, тестування;</a:t>
+            </a:r>
+          </a:p>
+          <a:p>
+            <a:r>
+              <a:rPr lang="uk-UA" dirty="0"/>
+              <a:t>Прогнозування швидкості росту втомних тріщин елементів конструкцій із алюмінієвого сплаву 2024-T351.</a:t>
+            </a:r>
+          </a:p>
+          <a:p>
+            <a:r>
+              <a:rPr lang="uk-UA" dirty="0"/>
+              <a:t>Методи дослідження: нейронні мережі як інструменти для прогнозування швидкості росту втомних тріщин. Програма, написана мовою </a:t>
+            </a:r>
+            <a:r>
+              <a:rPr lang="en-US" dirty="0"/>
+              <a:t>Python.</a:t>
+            </a:r>
+          </a:p>
+          <a:p>
+            <a:endParaRPr lang="uk-UA" dirty="0"/>
+          </a:p>
+          <a:p>
+            <a:pPr marL="0" indent="0">
+              <a:buNone/>
+            </a:pPr>
+            <a:endParaRPr lang="uk-UA" dirty="0"/>
+          </a:p>
+        </p:txBody>
+      </p:sp>
+      <p:sp>
+        <p:nvSpPr>
+          <p:cNvPr id="5" name="Прямокутник 4">
+            <a:extLst>
+              <a:ext uri="{FF2B5EF4-FFF2-40B4-BE49-F238E27FC236}">
+                <a16:creationId xmlns:a16="http://schemas.microsoft.com/office/drawing/2014/main" id="{BEBDAE72-4BFB-46D2-B00D-149C9D9C6581}"/>
+              </a:ext>
+            </a:extLst>
+          </p:cNvPr>
+          <p:cNvSpPr/>
+          <p:nvPr/>
+        </p:nvSpPr>
+        <p:spPr>
+          <a:xfrm>
+            <a:off x="3048000" y="2566328"/>
+            <a:ext cx="6096000" cy="395749"/>
+          </a:xfrm>
+          <a:prstGeom prst="rect">
+            <a:avLst/>
+          </a:prstGeom>
+        </p:spPr>
+        <p:txBody>
+          <a:bodyPr>
+            <a:spAutoFit/>
+          </a:bodyPr>
+          <a:lstStyle/>
+          <a:p>
+            <a:pPr indent="450215" algn="just">
+              <a:lnSpc>
+                <a:spcPct val="120000"/>
+              </a:lnSpc>
+              <a:spcAft>
+                <a:spcPts val="0"/>
+              </a:spcAft>
+            </a:pPr>
+            <a:endParaRPr lang="uk-UA" dirty="0">
+              <a:latin typeface="Times New Roman" panose="02020603050405020304" pitchFamily="18" charset="0"/>
+              <a:ea typeface="Calibri" panose="020F0502020204030204" pitchFamily="34" charset="0"/>
+              <a:cs typeface="Calibri" panose="020F0502020204030204" pitchFamily="34" charset="0"/>
+            </a:endParaRPr>
           </a:p>
         </p:txBody>
       </p:sp>
@@ -4090,7 +4258,6 @@
           </a:bodyPr>
           <a:lstStyle/>
           <a:p>
-            <a:pPr algn="ctr"/>
             <a:r>
               <a:rPr lang="uk-UA" sz="4000" dirty="0"/>
               <a:t>ПОСТАНОВКА ЗАДАЧІ</a:t>
@@ -4176,7 +4343,6 @@
           </a:bodyPr>
           <a:lstStyle/>
           <a:p>
-            <a:pPr algn="ctr"/>
             <a:r>
               <a:rPr lang="uk-UA" sz="4000" dirty="0"/>
               <a:t>МАШИННЕ НАВЧАННЯ</a:t>
@@ -4205,7 +4371,48 @@
           <a:bodyPr/>
           <a:lstStyle/>
           <a:p>
-            <a:endParaRPr lang="uk-UA"/>
+            <a:r>
+              <a:rPr lang="uk-UA" dirty="0"/>
+              <a:t>Галузь штучного інтелекту, мета якої – розробка методів, що втілюють різноманітні форми навчання, особливо механізми, що утворюють знання на прикладах або даних.</a:t>
+            </a:r>
+          </a:p>
+          <a:p>
+            <a:r>
+              <a:rPr lang="uk-UA" dirty="0"/>
+              <a:t>Основні методи машинного навчання:</a:t>
+            </a:r>
+          </a:p>
+          <a:p>
+            <a:r>
+              <a:rPr lang="uk-UA" dirty="0"/>
+              <a:t>Кероване (з учителем);</a:t>
+            </a:r>
+          </a:p>
+          <a:p>
+            <a:r>
+              <a:rPr lang="uk-UA" dirty="0"/>
+              <a:t>Без учителя;</a:t>
+            </a:r>
+          </a:p>
+          <a:p>
+            <a:r>
+              <a:rPr lang="uk-UA" dirty="0"/>
+              <a:t>З підкріпленням;</a:t>
+            </a:r>
+          </a:p>
+          <a:p>
+            <a:r>
+              <a:rPr lang="uk-UA" dirty="0"/>
+              <a:t>Моделі: дерева ухвалення рішень, метод опорних векторів, метод </a:t>
+            </a:r>
+            <a:r>
+              <a:rPr lang="en-US" dirty="0"/>
+              <a:t>k-</a:t>
+            </a:r>
+            <a:r>
+              <a:rPr lang="uk-UA" dirty="0"/>
+              <a:t>найближчих сусідів, нейронні мережі.</a:t>
+            </a:r>
           </a:p>
         </p:txBody>
       </p:sp>
@@ -4262,7 +4469,6 @@
           </a:bodyPr>
           <a:lstStyle/>
           <a:p>
-            <a:pPr algn="ctr"/>
             <a:r>
               <a:rPr lang="uk-UA" sz="4000" dirty="0"/>
               <a:t>НЕЙРОННІ МЕРЕЖІ</a:t>
@@ -4286,12 +4492,74 @@
             <p:ph idx="1"/>
           </p:nvPr>
         </p:nvSpPr>
-        <p:spPr/>
+        <p:spPr>
+          <a:xfrm>
+            <a:off x="1261872" y="1828800"/>
+            <a:ext cx="8595360" cy="5502442"/>
+          </a:xfrm>
+        </p:spPr>
         <p:txBody>
           <a:bodyPr/>
           <a:lstStyle/>
           <a:p>
-            <a:endParaRPr lang="uk-UA"/>
+            <a:r>
+              <a:rPr lang="uk-UA" dirty="0"/>
+              <a:t>Нелінійні математичні засоби, що симулюють обробку інформації людським мозком;</a:t>
+            </a:r>
+          </a:p>
+          <a:p>
+            <a:r>
+              <a:rPr lang="uk-UA" dirty="0"/>
+              <a:t>Штучний нейрон – простий об’єкт, здатний здійснювати лінійну трансформацію за допомогою функції передачі;</a:t>
+            </a:r>
+          </a:p>
+          <a:p>
+            <a:r>
+              <a:rPr lang="uk-UA" dirty="0"/>
+              <a:t>Нелінійність забезпечують функції активації (види?);</a:t>
+            </a:r>
+          </a:p>
+          <a:p>
+            <a:r>
+              <a:rPr lang="uk-UA" dirty="0"/>
+              <a:t>Навчання – мінімізація функції помилки.</a:t>
+            </a:r>
+          </a:p>
+          <a:p>
+            <a:r>
+              <a:rPr lang="uk-UA" dirty="0"/>
+              <a:t>Функції помилки:</a:t>
+            </a:r>
+          </a:p>
+          <a:p>
+            <a:r>
+              <a:rPr lang="uk-UA" dirty="0"/>
+              <a:t>Середньоквадратична;</a:t>
+            </a:r>
+          </a:p>
+          <a:p>
+            <a:r>
+              <a:rPr lang="uk-UA" dirty="0"/>
+              <a:t>Коренева середньоквадратична;</a:t>
+            </a:r>
+          </a:p>
+          <a:p>
+            <a:r>
+              <a:rPr lang="uk-UA" dirty="0"/>
+              <a:t>Середня похибка зміщення;</a:t>
+            </a:r>
+          </a:p>
+          <a:p>
+            <a:r>
+              <a:rPr lang="uk-UA" dirty="0"/>
+              <a:t>Абсолютна середня похибка зміщення;</a:t>
+            </a:r>
+          </a:p>
+          <a:p>
+            <a:r>
+              <a:rPr lang="uk-UA" dirty="0"/>
+              <a:t>Алгоритм зворотного поширення помилки.</a:t>
+            </a:r>
           </a:p>
         </p:txBody>
       </p:sp>
@@ -4343,7 +4611,7 @@
         </p:nvSpPr>
         <p:spPr>
           <a:xfrm>
-            <a:off x="906610" y="374227"/>
+            <a:off x="1261872" y="382694"/>
             <a:ext cx="10378779" cy="1325562"/>
           </a:xfrm>
         </p:spPr>
@@ -4376,12 +4644,68 @@
             <p:ph idx="1"/>
           </p:nvPr>
         </p:nvSpPr>
-        <p:spPr/>
+        <p:spPr>
+          <a:xfrm>
+            <a:off x="1261871" y="1828800"/>
+            <a:ext cx="9855307" cy="5029200"/>
+          </a:xfrm>
+        </p:spPr>
         <p:txBody>
           <a:bodyPr/>
           <a:lstStyle/>
           <a:p>
-            <a:endParaRPr lang="uk-UA"/>
+            <a:r>
+              <a:rPr lang="uk-UA" dirty="0"/>
+              <a:t>Еволюційні алгоритми – стохастичні методи оптимізації, що діють за принципами еволюції у природі;</a:t>
+            </a:r>
+          </a:p>
+          <a:p>
+            <a:r>
+              <a:rPr lang="uk-UA" dirty="0"/>
+              <a:t>Три рівні еволюції нейронних мереж:</a:t>
+            </a:r>
+          </a:p>
+          <a:p>
+            <a:r>
+              <a:rPr lang="uk-UA" dirty="0"/>
+              <a:t>Коригування ваг;</a:t>
+            </a:r>
+          </a:p>
+          <a:p>
+            <a:r>
+              <a:rPr lang="uk-UA" dirty="0"/>
+              <a:t>Еволюція архітектури;</a:t>
+            </a:r>
+          </a:p>
+          <a:p>
+            <a:r>
+              <a:rPr lang="uk-UA" dirty="0"/>
+              <a:t>Еволюція правила навчання (оновлення ваг);</a:t>
+            </a:r>
+          </a:p>
+          <a:p>
+            <a:r>
+              <a:rPr lang="uk-UA" dirty="0"/>
+              <a:t>Генетичний алгоритм – симуляція дарвінівської еволюції;</a:t>
+            </a:r>
+          </a:p>
+          <a:p>
+            <a:r>
+              <a:rPr lang="uk-UA" dirty="0"/>
+              <a:t>Популяція хромосом, кожна з яких – потенційний розв’язок задачі;</a:t>
+            </a:r>
+          </a:p>
+          <a:p>
+            <a:r>
+              <a:rPr lang="uk-UA" dirty="0"/>
+              <a:t>Схрещування – обмін генами між особинами-батьками, утворення особин-нащадків.</a:t>
+            </a:r>
+          </a:p>
+          <a:p>
+            <a:r>
+              <a:rPr lang="uk-UA" dirty="0"/>
+              <a:t>Мутація – випадкова зміна значень певних генів, дозволяє ввести новий матеріал у популяцію.</a:t>
+            </a:r>
           </a:p>
         </p:txBody>
       </p:sp>
@@ -4438,7 +4762,6 @@
           </a:bodyPr>
           <a:lstStyle/>
           <a:p>
-            <a:pPr algn="ctr"/>
             <a:r>
               <a:rPr lang="uk-UA" sz="4000" dirty="0"/>
               <a:t>ЗАДАЧА ПРО ВИЗНАЧЕННЯ…</a:t>
@@ -4462,12 +4785,114 @@
             <p:ph idx="1"/>
           </p:nvPr>
         </p:nvSpPr>
-        <p:spPr/>
+        <p:spPr>
+          <a:xfrm>
+            <a:off x="1261872" y="1828800"/>
+            <a:ext cx="9999686" cy="5029200"/>
+          </a:xfrm>
+        </p:spPr>
         <p:txBody>
           <a:bodyPr/>
           <a:lstStyle/>
           <a:p>
-            <a:endParaRPr lang="uk-UA"/>
+            <a:r>
+              <a:rPr lang="uk-UA" dirty="0"/>
+              <a:t>Причини появи </a:t>
+            </a:r>
+            <a:r>
+              <a:rPr lang="uk-UA"/>
+              <a:t>та росту </a:t>
+            </a:r>
+            <a:r>
+              <a:rPr lang="uk-UA" dirty="0"/>
+              <a:t>втомних тріщин – невеликі дефекти чи тріщини, наявні з самого початку чи такі, що з’явились у процесі роботи.</a:t>
+            </a:r>
+          </a:p>
+          <a:p>
+            <a:r>
+              <a:rPr lang="uk-UA" dirty="0"/>
+              <a:t>Виникнення стається через </a:t>
+            </a:r>
+            <a:r>
+              <a:rPr lang="uk-UA" dirty="0" err="1"/>
+              <a:t>узаємне</a:t>
+            </a:r>
+            <a:r>
+              <a:rPr lang="uk-UA" dirty="0"/>
+              <a:t> зміщення берегів тріщини.</a:t>
+            </a:r>
+          </a:p>
+          <a:p>
+            <a:r>
+              <a:rPr lang="uk-UA" dirty="0"/>
+              <a:t>Три типи зміщень:</a:t>
+            </a:r>
+          </a:p>
+          <a:p>
+            <a:r>
+              <a:rPr lang="uk-UA" dirty="0"/>
+              <a:t>Нормальний відрив;</a:t>
+            </a:r>
+          </a:p>
+          <a:p>
+            <a:r>
+              <a:rPr lang="uk-UA" dirty="0"/>
+              <a:t>Поперечний зсув</a:t>
+            </a:r>
+          </a:p>
+          <a:p>
+            <a:r>
+              <a:rPr lang="uk-UA" dirty="0"/>
+              <a:t>Поздовжній зсув;</a:t>
+            </a:r>
+          </a:p>
+          <a:p>
+            <a:r>
+              <a:rPr lang="uk-UA" dirty="0"/>
+              <a:t>Моделі задачі:</a:t>
+            </a:r>
+          </a:p>
+          <a:p>
+            <a:r>
+              <a:rPr lang="uk-UA" dirty="0"/>
+              <a:t>Закон </a:t>
+            </a:r>
+            <a:r>
+              <a:rPr lang="uk-UA" dirty="0" err="1"/>
+              <a:t>Періса</a:t>
+            </a:r>
+            <a:r>
+              <a:rPr lang="uk-UA" dirty="0"/>
+              <a:t>;</a:t>
+            </a:r>
+          </a:p>
+          <a:p>
+            <a:r>
+              <a:rPr lang="uk-UA" dirty="0"/>
+              <a:t>Закон </a:t>
+            </a:r>
+            <a:r>
+              <a:rPr lang="uk-UA" dirty="0" err="1"/>
+              <a:t>Вокера</a:t>
+            </a:r>
+            <a:r>
+              <a:rPr lang="uk-UA" dirty="0"/>
+              <a:t>;</a:t>
+            </a:r>
+          </a:p>
+          <a:p>
+            <a:r>
+              <a:rPr lang="uk-UA" dirty="0"/>
+              <a:t>Модель </a:t>
+            </a:r>
+            <a:r>
+              <a:rPr lang="uk-UA" dirty="0" err="1"/>
+              <a:t>Формана</a:t>
+            </a:r>
+            <a:r>
+              <a:rPr lang="uk-UA" dirty="0"/>
+              <a:t>.</a:t>
+            </a:r>
           </a:p>
         </p:txBody>
       </p:sp>
@@ -4519,7 +4944,7 @@
         </p:nvSpPr>
         <p:spPr>
           <a:xfrm>
-            <a:off x="110066" y="238760"/>
+            <a:off x="330200" y="247227"/>
             <a:ext cx="11531600" cy="1325562"/>
           </a:xfrm>
         </p:spPr>
@@ -4529,7 +4954,6 @@
           </a:bodyPr>
           <a:lstStyle/>
           <a:p>
-            <a:pPr algn="ctr"/>
             <a:r>
               <a:rPr lang="uk-UA" sz="4000" dirty="0"/>
               <a:t>ОПИС ПРОГРАМНОГО ЗАБЕЗПЕЧЕННЯ</a:t>
@@ -4558,7 +4982,54 @@
           <a:bodyPr/>
           <a:lstStyle/>
           <a:p>
-            <a:endParaRPr lang="uk-UA"/>
+            <a:r>
+              <a:rPr lang="uk-UA" dirty="0"/>
+              <a:t>Програма, написана мовою </a:t>
+            </a:r>
+            <a:r>
+              <a:rPr lang="en-US" dirty="0"/>
+              <a:t>Python</a:t>
+            </a:r>
+            <a:r>
+              <a:rPr lang="uk-UA" dirty="0"/>
+              <a:t>.</a:t>
+            </a:r>
+          </a:p>
+          <a:p>
+            <a:r>
+              <a:rPr lang="uk-UA" dirty="0"/>
+              <a:t>Складається 3 9 модулів, що відповідають за:</a:t>
+            </a:r>
+          </a:p>
+          <a:p>
+            <a:r>
+              <a:rPr lang="uk-UA" dirty="0"/>
+              <a:t>Отримання вибірки даних;</a:t>
+            </a:r>
+          </a:p>
+          <a:p>
+            <a:r>
+              <a:rPr lang="uk-UA" dirty="0"/>
+              <a:t>Утворення нейронної мережі;</a:t>
+            </a:r>
+          </a:p>
+          <a:p>
+            <a:r>
+              <a:rPr lang="uk-UA" dirty="0"/>
+              <a:t>Зберігання можливих активаційних функцій;</a:t>
+            </a:r>
+          </a:p>
+          <a:p>
+            <a:r>
+              <a:rPr lang="uk-UA" dirty="0"/>
+              <a:t>Два алгоритми навчання нейронної мережі;</a:t>
+            </a:r>
+          </a:p>
+          <a:p>
+            <a:r>
+              <a:rPr lang="uk-UA" dirty="0"/>
+              <a:t>Виведення результатів, створення графіків.</a:t>
+            </a:r>
           </a:p>
         </p:txBody>
       </p:sp>
@@ -4615,7 +5086,6 @@
           </a:bodyPr>
           <a:lstStyle/>
           <a:p>
-            <a:pPr algn="ctr"/>
             <a:r>
               <a:rPr lang="uk-UA" sz="4000" dirty="0"/>
               <a:t>АНАЛІЗ РЕЗУЛЬТАТІВ</a:t>
@@ -4644,7 +5114,7 @@
           <a:bodyPr/>
           <a:lstStyle/>
           <a:p>
-            <a:endParaRPr lang="uk-UA"/>
+            <a:endParaRPr lang="uk-UA" dirty="0"/>
           </a:p>
         </p:txBody>
       </p:sp>

</xml_diff>

<commit_message>
Final updates, getting revies, antiplagiarism checks
</commit_message>
<xml_diff>
--- a/Застосування методів машинного навчання для прогнозування елементів конструкцій.pptx
+++ b/Застосування методів машинного навчання для прогнозування елементів конструкцій.pptx
@@ -114,6 +114,11 @@
       </a:defRPr>
     </a:lvl9pPr>
   </p:defaultTextStyle>
+  <p:extLst>
+    <p:ext uri="{EFAFB233-063F-42B5-8137-9DF3F51BA10A}">
+      <p15:sldGuideLst xmlns:p15="http://schemas.microsoft.com/office/powerpoint/2012/main"/>
+    </p:ext>
+  </p:extLst>
 </p:presentation>
 </file>
 
@@ -285,7 +290,7 @@
           <a:p>
             <a:fld id="{BDE600C1-EB9E-4108-812C-8C04D589D1B5}" type="datetimeFigureOut">
               <a:rPr lang="uk-UA" smtClean="0"/>
-              <a:t>11.06.2022</a:t>
+              <a:t>14.06.2022</a:t>
             </a:fld>
             <a:endParaRPr lang="uk-UA"/>
           </a:p>
@@ -513,7 +518,7 @@
           <a:p>
             <a:fld id="{BDE600C1-EB9E-4108-812C-8C04D589D1B5}" type="datetimeFigureOut">
               <a:rPr lang="uk-UA" smtClean="0"/>
-              <a:t>11.06.2022</a:t>
+              <a:t>14.06.2022</a:t>
             </a:fld>
             <a:endParaRPr lang="uk-UA"/>
           </a:p>
@@ -693,7 +698,7 @@
           <a:p>
             <a:fld id="{BDE600C1-EB9E-4108-812C-8C04D589D1B5}" type="datetimeFigureOut">
               <a:rPr lang="uk-UA" smtClean="0"/>
-              <a:t>11.06.2022</a:t>
+              <a:t>14.06.2022</a:t>
             </a:fld>
             <a:endParaRPr lang="uk-UA"/>
           </a:p>
@@ -863,7 +868,7 @@
           <a:p>
             <a:fld id="{BDE600C1-EB9E-4108-812C-8C04D589D1B5}" type="datetimeFigureOut">
               <a:rPr lang="uk-UA" smtClean="0"/>
-              <a:t>11.06.2022</a:t>
+              <a:t>14.06.2022</a:t>
             </a:fld>
             <a:endParaRPr lang="uk-UA"/>
           </a:p>
@@ -1117,7 +1122,7 @@
           <a:p>
             <a:fld id="{BDE600C1-EB9E-4108-812C-8C04D589D1B5}" type="datetimeFigureOut">
               <a:rPr lang="uk-UA" smtClean="0"/>
-              <a:t>11.06.2022</a:t>
+              <a:t>14.06.2022</a:t>
             </a:fld>
             <a:endParaRPr lang="uk-UA"/>
           </a:p>
@@ -1443,7 +1448,7 @@
           <a:p>
             <a:fld id="{BDE600C1-EB9E-4108-812C-8C04D589D1B5}" type="datetimeFigureOut">
               <a:rPr lang="uk-UA" smtClean="0"/>
-              <a:t>11.06.2022</a:t>
+              <a:t>14.06.2022</a:t>
             </a:fld>
             <a:endParaRPr lang="uk-UA"/>
           </a:p>
@@ -1894,7 +1899,7 @@
           <a:p>
             <a:fld id="{BDE600C1-EB9E-4108-812C-8C04D589D1B5}" type="datetimeFigureOut">
               <a:rPr lang="uk-UA" smtClean="0"/>
-              <a:t>11.06.2022</a:t>
+              <a:t>14.06.2022</a:t>
             </a:fld>
             <a:endParaRPr lang="uk-UA"/>
           </a:p>
@@ -2012,7 +2017,7 @@
           <a:p>
             <a:fld id="{BDE600C1-EB9E-4108-812C-8C04D589D1B5}" type="datetimeFigureOut">
               <a:rPr lang="uk-UA" smtClean="0"/>
-              <a:t>11.06.2022</a:t>
+              <a:t>14.06.2022</a:t>
             </a:fld>
             <a:endParaRPr lang="uk-UA"/>
           </a:p>
@@ -2107,7 +2112,7 @@
           <a:p>
             <a:fld id="{BDE600C1-EB9E-4108-812C-8C04D589D1B5}" type="datetimeFigureOut">
               <a:rPr lang="uk-UA" smtClean="0"/>
-              <a:t>11.06.2022</a:t>
+              <a:t>14.06.2022</a:t>
             </a:fld>
             <a:endParaRPr lang="uk-UA"/>
           </a:p>
@@ -2394,7 +2399,7 @@
           <a:p>
             <a:fld id="{BDE600C1-EB9E-4108-812C-8C04D589D1B5}" type="datetimeFigureOut">
               <a:rPr lang="uk-UA" smtClean="0"/>
-              <a:t>11.06.2022</a:t>
+              <a:t>14.06.2022</a:t>
             </a:fld>
             <a:endParaRPr lang="uk-UA"/>
           </a:p>
@@ -2716,7 +2721,7 @@
           <a:p>
             <a:fld id="{BDE600C1-EB9E-4108-812C-8C04D589D1B5}" type="datetimeFigureOut">
               <a:rPr lang="uk-UA" smtClean="0"/>
-              <a:t>11.06.2022</a:t>
+              <a:t>14.06.2022</a:t>
             </a:fld>
             <a:endParaRPr lang="uk-UA"/>
           </a:p>
@@ -2970,7 +2975,7 @@
           <a:p>
             <a:fld id="{BDE600C1-EB9E-4108-812C-8C04D589D1B5}" type="datetimeFigureOut">
               <a:rPr lang="uk-UA" smtClean="0"/>
-              <a:t>11.06.2022</a:t>
+              <a:t>14.06.2022</a:t>
             </a:fld>
             <a:endParaRPr lang="uk-UA"/>
           </a:p>
@@ -3927,7 +3932,7 @@
           <a:p>
             <a:r>
               <a:rPr lang="uk-UA" dirty="0"/>
-              <a:t>Створено та протестовано програмний код розв’язання задачі за допомогою нейронної мережі.</a:t>
+              <a:t>Написано та протестовано програмний код розв’язання задачі за допомогою нейронної мережі.</a:t>
             </a:r>
           </a:p>
           <a:p>
@@ -4132,7 +4137,7 @@
           <a:p>
             <a:r>
               <a:rPr lang="uk-UA" dirty="0"/>
-              <a:t>Створення програмного забезпечення для створення та навчання нейронної мережі, визначення її оптимальної архітектури, тестування;</a:t>
+              <a:t>Розробка програмного забезпечення для побудови та навчання нейронної мережі, визначення її оптимальної архітектури, тестування;</a:t>
             </a:r>
           </a:p>
           <a:p>
@@ -4147,7 +4152,9 @@
               <a:t>Методи дослідження: нейронні мережі як інструменти для прогнозування швидкості росту втомних тріщин. Програма, написана мовою </a:t>
             </a:r>
             <a:r>
-              <a:rPr lang="en-US" dirty="0"/>
+              <a:rPr lang="en-US" dirty="0">
+                <a:latin typeface="Agency FB" panose="020B0503020202020204" pitchFamily="34" charset="0"/>
+              </a:rPr>
               <a:t>Python.</a:t>
             </a:r>
           </a:p>
@@ -4528,41 +4535,47 @@
           <a:p>
             <a:r>
               <a:rPr lang="uk-UA" dirty="0"/>
-              <a:t>Функції помилки:</a:t>
-            </a:r>
-          </a:p>
-          <a:p>
-            <a:r>
-              <a:rPr lang="uk-UA" dirty="0"/>
-              <a:t>Середньоквадратична;</a:t>
-            </a:r>
-          </a:p>
-          <a:p>
-            <a:r>
-              <a:rPr lang="uk-UA" dirty="0"/>
-              <a:t>Коренева середньоквадратична;</a:t>
-            </a:r>
-          </a:p>
-          <a:p>
-            <a:r>
-              <a:rPr lang="uk-UA" dirty="0"/>
-              <a:t>Середня похибка зміщення;</a:t>
-            </a:r>
-          </a:p>
-          <a:p>
-            <a:r>
-              <a:rPr lang="uk-UA" dirty="0"/>
-              <a:t>Абсолютна середня похибка зміщення;</a:t>
-            </a:r>
-          </a:p>
-          <a:p>
-            <a:r>
-              <a:rPr lang="uk-UA" dirty="0"/>
-              <a:t>Алгоритм зворотного поширення помилки.</a:t>
-            </a:r>
-          </a:p>
-        </p:txBody>
-      </p:sp>
+              <a:t>Алгоритм зворотного поширення помилки (градієнтного спуску).</a:t>
+            </a:r>
+          </a:p>
+        </p:txBody>
+      </p:sp>
+      <p:pic>
+        <p:nvPicPr>
+          <p:cNvPr id="5" name="Рисунок 4">
+            <a:extLst>
+              <a:ext uri="{FF2B5EF4-FFF2-40B4-BE49-F238E27FC236}">
+                <a16:creationId xmlns:a16="http://schemas.microsoft.com/office/drawing/2014/main" id="{0D8317C5-480D-4A82-AD7D-992C38F41754}"/>
+              </a:ext>
+            </a:extLst>
+          </p:cNvPr>
+          <p:cNvPicPr>
+            <a:picLocks noChangeAspect="1"/>
+          </p:cNvPicPr>
+          <p:nvPr/>
+        </p:nvPicPr>
+        <p:blipFill>
+          <a:blip r:embed="rId2">
+            <a:extLst>
+              <a:ext uri="{28A0092B-C50C-407E-A947-70E740481C1C}">
+                <a14:useLocalDpi xmlns:a14="http://schemas.microsoft.com/office/drawing/2010/main" val="0"/>
+              </a:ext>
+            </a:extLst>
+          </a:blip>
+          <a:stretch>
+            <a:fillRect/>
+          </a:stretch>
+        </p:blipFill>
+        <p:spPr>
+          <a:xfrm>
+            <a:off x="2298192" y="4665592"/>
+            <a:ext cx="7620000" cy="2133141"/>
+          </a:xfrm>
+          <a:prstGeom prst="rect">
+            <a:avLst/>
+          </a:prstGeom>
+        </p:spPr>
+      </p:pic>
     </p:spTree>
     <p:extLst>
       <p:ext uri="{BB962C8B-B14F-4D97-AF65-F5344CB8AC3E}">
@@ -4662,30 +4675,6 @@
           <a:p>
             <a:r>
               <a:rPr lang="uk-UA" dirty="0"/>
-              <a:t>Три рівні еволюції нейронних мереж:</a:t>
-            </a:r>
-          </a:p>
-          <a:p>
-            <a:r>
-              <a:rPr lang="uk-UA" dirty="0"/>
-              <a:t>Коригування ваг;</a:t>
-            </a:r>
-          </a:p>
-          <a:p>
-            <a:r>
-              <a:rPr lang="uk-UA" dirty="0"/>
-              <a:t>Еволюція архітектури;</a:t>
-            </a:r>
-          </a:p>
-          <a:p>
-            <a:r>
-              <a:rPr lang="uk-UA" dirty="0"/>
-              <a:t>Еволюція правила навчання (оновлення ваг);</a:t>
-            </a:r>
-          </a:p>
-          <a:p>
-            <a:r>
-              <a:rPr lang="uk-UA" dirty="0"/>
               <a:t>Генетичний алгоритм – симуляція дарвінівської еволюції;</a:t>
             </a:r>
           </a:p>
@@ -4709,6 +4698,42 @@
           </a:p>
         </p:txBody>
       </p:sp>
+      <p:pic>
+        <p:nvPicPr>
+          <p:cNvPr id="5" name="Рисунок 4">
+            <a:extLst>
+              <a:ext uri="{FF2B5EF4-FFF2-40B4-BE49-F238E27FC236}">
+                <a16:creationId xmlns:a16="http://schemas.microsoft.com/office/drawing/2014/main" id="{D1DA0C36-EEE3-4290-BE94-57CBC494429E}"/>
+              </a:ext>
+            </a:extLst>
+          </p:cNvPr>
+          <p:cNvPicPr>
+            <a:picLocks noChangeAspect="1"/>
+          </p:cNvPicPr>
+          <p:nvPr/>
+        </p:nvPicPr>
+        <p:blipFill>
+          <a:blip r:embed="rId2">
+            <a:extLst>
+              <a:ext uri="{28A0092B-C50C-407E-A947-70E740481C1C}">
+                <a14:useLocalDpi xmlns:a14="http://schemas.microsoft.com/office/drawing/2010/main" val="0"/>
+              </a:ext>
+            </a:extLst>
+          </a:blip>
+          <a:stretch>
+            <a:fillRect/>
+          </a:stretch>
+        </p:blipFill>
+        <p:spPr>
+          <a:xfrm>
+            <a:off x="3120422" y="5042737"/>
+            <a:ext cx="6138203" cy="1325562"/>
+          </a:xfrm>
+          <a:prstGeom prst="rect">
+            <a:avLst/>
+          </a:prstGeom>
+        </p:spPr>
+      </p:pic>
     </p:spTree>
     <p:extLst>
       <p:ext uri="{BB962C8B-B14F-4D97-AF65-F5344CB8AC3E}">
@@ -4797,15 +4822,7 @@
           <a:p>
             <a:r>
               <a:rPr lang="uk-UA" dirty="0"/>
-              <a:t>Причини появи </a:t>
-            </a:r>
-            <a:r>
-              <a:rPr lang="uk-UA"/>
-              <a:t>та росту </a:t>
-            </a:r>
-            <a:r>
-              <a:rPr lang="uk-UA" dirty="0"/>
-              <a:t>втомних тріщин – невеликі дефекти чи тріщини, наявні з самого початку чи такі, що з’явились у процесі роботи.</a:t>
+              <a:t>Причини появи та росту втомних тріщин – невеликі дефекти чи тріщини, наявні з самого початку чи такі, що з’явились у процесі роботи.</a:t>
             </a:r>
           </a:p>
           <a:p>
@@ -4825,30 +4842,6 @@
           <a:p>
             <a:r>
               <a:rPr lang="uk-UA" dirty="0"/>
-              <a:t>Три типи зміщень:</a:t>
-            </a:r>
-          </a:p>
-          <a:p>
-            <a:r>
-              <a:rPr lang="uk-UA" dirty="0"/>
-              <a:t>Нормальний відрив;</a:t>
-            </a:r>
-          </a:p>
-          <a:p>
-            <a:r>
-              <a:rPr lang="uk-UA" dirty="0"/>
-              <a:t>Поперечний зсув</a:t>
-            </a:r>
-          </a:p>
-          <a:p>
-            <a:r>
-              <a:rPr lang="uk-UA" dirty="0"/>
-              <a:t>Поздовжній зсув;</a:t>
-            </a:r>
-          </a:p>
-          <a:p>
-            <a:r>
-              <a:rPr lang="uk-UA" dirty="0"/>
               <a:t>Моделі задачі:</a:t>
             </a:r>
           </a:p>
@@ -4896,6 +4889,42 @@
           </a:p>
         </p:txBody>
       </p:sp>
+      <p:pic>
+        <p:nvPicPr>
+          <p:cNvPr id="5" name="Рисунок 4">
+            <a:extLst>
+              <a:ext uri="{FF2B5EF4-FFF2-40B4-BE49-F238E27FC236}">
+                <a16:creationId xmlns:a16="http://schemas.microsoft.com/office/drawing/2014/main" id="{9D2E9440-4511-4018-8183-40061EBAE2BF}"/>
+              </a:ext>
+            </a:extLst>
+          </p:cNvPr>
+          <p:cNvPicPr>
+            <a:picLocks noChangeAspect="1"/>
+          </p:cNvPicPr>
+          <p:nvPr/>
+        </p:nvPicPr>
+        <p:blipFill>
+          <a:blip r:embed="rId2">
+            <a:extLst>
+              <a:ext uri="{28A0092B-C50C-407E-A947-70E740481C1C}">
+                <a14:useLocalDpi xmlns:a14="http://schemas.microsoft.com/office/drawing/2010/main" val="0"/>
+              </a:ext>
+            </a:extLst>
+          </a:blip>
+          <a:stretch>
+            <a:fillRect/>
+          </a:stretch>
+        </p:blipFill>
+        <p:spPr>
+          <a:xfrm>
+            <a:off x="1782028" y="4828029"/>
+            <a:ext cx="8403353" cy="1664211"/>
+          </a:xfrm>
+          <a:prstGeom prst="rect">
+            <a:avLst/>
+          </a:prstGeom>
+        </p:spPr>
+      </p:pic>
     </p:spTree>
     <p:extLst>
       <p:ext uri="{BB962C8B-B14F-4D97-AF65-F5344CB8AC3E}">
@@ -5010,7 +5039,7 @@
           <a:p>
             <a:r>
               <a:rPr lang="uk-UA" dirty="0"/>
-              <a:t>Утворення нейронної мережі;</a:t>
+              <a:t>Побудову нейронної мережі;</a:t>
             </a:r>
           </a:p>
           <a:p>

</xml_diff>